<commit_message>
add pasta e arquivos, conclusão do projeto final e entrega
</commit_message>
<xml_diff>
--- a/Dia01out/Análise gráficos peças.pptx
+++ b/Dia01out/Análise gráficos peças.pptx
@@ -2,13 +2,13 @@
 <file path=ppt/presentation.xml><?xml version="1.0" encoding="utf-8"?>
 <p:presentation xmlns:a="http://schemas.openxmlformats.org/drawingml/2006/main" xmlns:r="http://schemas.openxmlformats.org/officeDocument/2006/relationships" xmlns:p="http://schemas.openxmlformats.org/presentationml/2006/main" saveSubsetFonts="1">
   <p:sldMasterIdLst>
-    <p:sldMasterId id="2147483648" r:id="rId4"/>
+    <p:sldMasterId id="2147483648" r:id="rId1"/>
   </p:sldMasterIdLst>
   <p:sldIdLst>
-    <p:sldId id="256" r:id="rId5"/>
-    <p:sldId id="257" r:id="rId6"/>
-    <p:sldId id="258" r:id="rId7"/>
-    <p:sldId id="259" r:id="rId8"/>
+    <p:sldId id="256" r:id="rId2"/>
+    <p:sldId id="257" r:id="rId3"/>
+    <p:sldId id="258" r:id="rId4"/>
+    <p:sldId id="259" r:id="rId5"/>
   </p:sldIdLst>
   <p:sldSz cx="12192000" cy="6858000"/>
   <p:notesSz cx="6858000" cy="9144000"/>
@@ -107,11 +107,6 @@
       </a:defRPr>
     </a:lvl9pPr>
   </p:defaultTextStyle>
-  <p:extLst>
-    <p:ext uri="{EFAFB233-063F-42B5-8137-9DF3F51BA10A}">
-      <p15:sldGuideLst xmlns:p15="http://schemas.microsoft.com/office/powerpoint/2012/main"/>
-    </p:ext>
-  </p:extLst>
 </p:presentation>
 </file>
 
@@ -4251,15 +4246,6 @@
 </file>
 
 <file path=customXml/item1.xml><?xml version="1.0" encoding="utf-8"?>
-<?mso-contentType ?>
-<FormTemplates xmlns="http://schemas.microsoft.com/sharepoint/v3/contenttype/forms">
-  <Display>DocumentLibraryForm</Display>
-  <Edit>DocumentLibraryForm</Edit>
-  <New>DocumentLibraryForm</New>
-</FormTemplates>
-</file>
-
-<file path=customXml/item2.xml><?xml version="1.0" encoding="utf-8"?>
 <ct:contentTypeSchema xmlns:ct="http://schemas.microsoft.com/office/2006/metadata/contentType" xmlns:ma="http://schemas.microsoft.com/office/2006/metadata/properties/metaAttributes" ct:_="" ma:_="" ma:contentTypeName="Documento" ma:contentTypeID="0x01010013B1C5CF22401748BB49F47BC6E37036" ma:contentTypeVersion="10" ma:contentTypeDescription="Crie um novo documento." ma:contentTypeScope="" ma:versionID="b56505d1aba82904f1c53839dece339e">
   <xsd:schema xmlns:xsd="http://www.w3.org/2001/XMLSchema" xmlns:xs="http://www.w3.org/2001/XMLSchema" xmlns:p="http://schemas.microsoft.com/office/2006/metadata/properties" xmlns:ns2="cda1a4e9-092b-41d2-9ab4-235eed328500" xmlns:ns3="d1c70a27-449a-48fd-999c-114e0f37d88c" targetNamespace="http://schemas.microsoft.com/office/2006/metadata/properties" ma:root="true" ma:fieldsID="f229e0a0788819d0c9d7bb15a9390657" ns2:_="" ns3:_="">
     <xsd:import namespace="cda1a4e9-092b-41d2-9ab4-235eed328500"/>
@@ -4448,6 +4434,15 @@
 </ct:contentTypeSchema>
 </file>
 
+<file path=customXml/item2.xml><?xml version="1.0" encoding="utf-8"?>
+<?mso-contentType ?>
+<FormTemplates xmlns="http://schemas.microsoft.com/sharepoint/v3/contenttype/forms">
+  <Display>DocumentLibraryForm</Display>
+  <Edit>DocumentLibraryForm</Edit>
+  <New>DocumentLibraryForm</New>
+</FormTemplates>
+</file>
+
 <file path=customXml/item3.xml><?xml version="1.0" encoding="utf-8"?>
 <p:properties xmlns:p="http://schemas.microsoft.com/office/2006/metadata/properties" xmlns:xsi="http://www.w3.org/2001/XMLSchema-instance" xmlns:pc="http://schemas.microsoft.com/office/infopath/2007/PartnerControls">
   <documentManagement>
@@ -4460,39 +4455,13 @@
 </file>
 
 <file path=customXml/itemProps1.xml><?xml version="1.0" encoding="utf-8"?>
-<ds:datastoreItem xmlns:ds="http://schemas.openxmlformats.org/officeDocument/2006/customXml" ds:itemID="{C50AA527-42F1-4051-9822-4DB96D46A9D1}">
-  <ds:schemaRefs>
-    <ds:schemaRef ds:uri="http://schemas.microsoft.com/sharepoint/v3/contenttype/forms"/>
-  </ds:schemaRefs>
-</ds:datastoreItem>
+<ds:datastoreItem xmlns:ds="http://schemas.openxmlformats.org/officeDocument/2006/customXml" ds:itemID="{B754508A-776C-4A3A-B6F2-7204DE2BA1E5}"/>
 </file>
 
 <file path=customXml/itemProps2.xml><?xml version="1.0" encoding="utf-8"?>
-<ds:datastoreItem xmlns:ds="http://schemas.openxmlformats.org/officeDocument/2006/customXml" ds:itemID="{B754508A-776C-4A3A-B6F2-7204DE2BA1E5}">
-  <ds:schemaRefs>
-    <ds:schemaRef ds:uri="http://schemas.microsoft.com/office/2006/metadata/contentType"/>
-    <ds:schemaRef ds:uri="http://schemas.microsoft.com/office/2006/metadata/properties/metaAttributes"/>
-    <ds:schemaRef ds:uri="http://www.w3.org/2001/XMLSchema"/>
-    <ds:schemaRef ds:uri="http://schemas.microsoft.com/office/2006/metadata/properties"/>
-    <ds:schemaRef ds:uri="cda1a4e9-092b-41d2-9ab4-235eed328500"/>
-    <ds:schemaRef ds:uri="d1c70a27-449a-48fd-999c-114e0f37d88c"/>
-    <ds:schemaRef ds:uri="http://schemas.microsoft.com/office/2006/documentManagement/types"/>
-    <ds:schemaRef ds:uri="http://schemas.microsoft.com/office/infopath/2007/PartnerControls"/>
-    <ds:schemaRef ds:uri="http://schemas.openxmlformats.org/package/2006/metadata/core-properties"/>
-    <ds:schemaRef ds:uri="http://purl.org/dc/elements/1.1/"/>
-    <ds:schemaRef ds:uri="http://purl.org/dc/terms/"/>
-    <ds:schemaRef ds:uri="http://schemas.microsoft.com/internal/obd"/>
-  </ds:schemaRefs>
-</ds:datastoreItem>
+<ds:datastoreItem xmlns:ds="http://schemas.openxmlformats.org/officeDocument/2006/customXml" ds:itemID="{C50AA527-42F1-4051-9822-4DB96D46A9D1}"/>
 </file>
 
 <file path=customXml/itemProps3.xml><?xml version="1.0" encoding="utf-8"?>
-<ds:datastoreItem xmlns:ds="http://schemas.openxmlformats.org/officeDocument/2006/customXml" ds:itemID="{2A840385-6BE6-40F3-A2E5-B96807EED7F1}">
-  <ds:schemaRefs>
-    <ds:schemaRef ds:uri="http://schemas.microsoft.com/office/2006/metadata/properties"/>
-    <ds:schemaRef ds:uri="http://schemas.microsoft.com/office/infopath/2007/PartnerControls"/>
-    <ds:schemaRef ds:uri="cda1a4e9-092b-41d2-9ab4-235eed328500"/>
-    <ds:schemaRef ds:uri="d1c70a27-449a-48fd-999c-114e0f37d88c"/>
-  </ds:schemaRefs>
-</ds:datastoreItem>
+<ds:datastoreItem xmlns:ds="http://schemas.openxmlformats.org/officeDocument/2006/customXml" ds:itemID="{2A840385-6BE6-40F3-A2E5-B96807EED7F1}"/>
 </file>
</xml_diff>